<commit_message>
se agregan pequeñas correcciones en los archivos doc,pptx
</commit_message>
<xml_diff>
--- a/PROYECTO AUTO/MATERIAL AULICO/Implementacion de proyecto Iot – grupo 3.pptx
+++ b/PROYECTO AUTO/MATERIAL AULICO/Implementacion de proyecto Iot – grupo 3.pptx
@@ -109,6 +109,11 @@
       </a:defRPr>
     </a:lvl9pPr>
   </p:defaultTextStyle>
+  <p:extLst>
+    <p:ext uri="{EFAFB233-063F-42B5-8137-9DF3F51BA10A}">
+      <p15:sldGuideLst xmlns:p15="http://schemas.microsoft.com/office/powerpoint/2012/main"/>
+    </p:ext>
+  </p:extLst>
 </p:presentation>
 </file>
 
@@ -282,7 +287,7 @@
           <a:p>
             <a:fld id="{48A87A34-81AB-432B-8DAE-1953F412C126}" type="datetimeFigureOut">
               <a:rPr lang="en-US" dirty="0"/>
-              <a:t>9/10/2022</a:t>
+              <a:t>9/11/2022</a:t>
             </a:fld>
             <a:endParaRPr lang="en-US" dirty="0"/>
           </a:p>
@@ -544,7 +549,7 @@
           <a:p>
             <a:fld id="{48A87A34-81AB-432B-8DAE-1953F412C126}" type="datetimeFigureOut">
               <a:rPr lang="en-US" dirty="0"/>
-              <a:t>9/10/2022</a:t>
+              <a:t>9/11/2022</a:t>
             </a:fld>
             <a:endParaRPr lang="en-US" dirty="0"/>
           </a:p>
@@ -771,7 +776,7 @@
             <a:fld id="{48A87A34-81AB-432B-8DAE-1953F412C126}" type="datetimeFigureOut">
               <a:rPr lang="en-US" dirty="0"/>
               <a:pPr/>
-              <a:t>9/10/2022</a:t>
+              <a:t>9/11/2022</a:t>
             </a:fld>
             <a:endParaRPr lang="en-US" dirty="0"/>
           </a:p>
@@ -1077,7 +1082,7 @@
             <a:fld id="{48A87A34-81AB-432B-8DAE-1953F412C126}" type="datetimeFigureOut">
               <a:rPr lang="en-US" dirty="0"/>
               <a:pPr/>
-              <a:t>9/10/2022</a:t>
+              <a:t>9/11/2022</a:t>
             </a:fld>
             <a:endParaRPr lang="en-US" dirty="0"/>
           </a:p>
@@ -1546,7 +1551,7 @@
             <a:fld id="{48A87A34-81AB-432B-8DAE-1953F412C126}" type="datetimeFigureOut">
               <a:rPr lang="en-US" dirty="0"/>
               <a:pPr/>
-              <a:t>9/10/2022</a:t>
+              <a:t>9/11/2022</a:t>
             </a:fld>
             <a:endParaRPr lang="en-US" dirty="0"/>
           </a:p>
@@ -2088,7 +2093,7 @@
           <a:p>
             <a:fld id="{48A87A34-81AB-432B-8DAE-1953F412C126}" type="datetimeFigureOut">
               <a:rPr lang="en-US" dirty="0"/>
-              <a:t>9/10/2022</a:t>
+              <a:t>9/11/2022</a:t>
             </a:fld>
             <a:endParaRPr lang="en-US" dirty="0"/>
           </a:p>
@@ -2857,7 +2862,7 @@
           <a:p>
             <a:fld id="{48A87A34-81AB-432B-8DAE-1953F412C126}" type="datetimeFigureOut">
               <a:rPr lang="en-US" dirty="0"/>
-              <a:t>9/10/2022</a:t>
+              <a:t>9/11/2022</a:t>
             </a:fld>
             <a:endParaRPr lang="en-US" dirty="0"/>
           </a:p>
@@ -3027,7 +3032,7 @@
           <a:p>
             <a:fld id="{48A87A34-81AB-432B-8DAE-1953F412C126}" type="datetimeFigureOut">
               <a:rPr lang="en-US" dirty="0"/>
-              <a:t>9/10/2022</a:t>
+              <a:t>9/11/2022</a:t>
             </a:fld>
             <a:endParaRPr lang="en-US" dirty="0"/>
           </a:p>
@@ -3246,7 +3251,7 @@
             <a:fld id="{48A87A34-81AB-432B-8DAE-1953F412C126}" type="datetimeFigureOut">
               <a:rPr lang="en-US" dirty="0"/>
               <a:pPr/>
-              <a:t>9/10/2022</a:t>
+              <a:t>9/11/2022</a:t>
             </a:fld>
             <a:endParaRPr lang="en-US" dirty="0"/>
           </a:p>
@@ -3421,7 +3426,7 @@
           <a:p>
             <a:fld id="{48A87A34-81AB-432B-8DAE-1953F412C126}" type="datetimeFigureOut">
               <a:rPr lang="en-US" dirty="0"/>
-              <a:t>9/10/2022</a:t>
+              <a:t>9/11/2022</a:t>
             </a:fld>
             <a:endParaRPr lang="en-US" dirty="0"/>
           </a:p>
@@ -3706,7 +3711,7 @@
             <a:fld id="{48A87A34-81AB-432B-8DAE-1953F412C126}" type="datetimeFigureOut">
               <a:rPr lang="en-US" dirty="0"/>
               <a:pPr/>
-              <a:t>9/10/2022</a:t>
+              <a:t>9/11/2022</a:t>
             </a:fld>
             <a:endParaRPr lang="en-US" dirty="0"/>
           </a:p>
@@ -3943,7 +3948,7 @@
           <a:p>
             <a:fld id="{48A87A34-81AB-432B-8DAE-1953F412C126}" type="datetimeFigureOut">
               <a:rPr lang="en-US" dirty="0"/>
-              <a:t>9/10/2022</a:t>
+              <a:t>9/11/2022</a:t>
             </a:fld>
             <a:endParaRPr lang="en-US" dirty="0"/>
           </a:p>
@@ -4317,7 +4322,7 @@
           <a:p>
             <a:fld id="{48A87A34-81AB-432B-8DAE-1953F412C126}" type="datetimeFigureOut">
               <a:rPr lang="en-US" dirty="0"/>
-              <a:t>9/10/2022</a:t>
+              <a:t>9/11/2022</a:t>
             </a:fld>
             <a:endParaRPr lang="en-US" dirty="0"/>
           </a:p>
@@ -4430,7 +4435,7 @@
           <a:p>
             <a:fld id="{48A87A34-81AB-432B-8DAE-1953F412C126}" type="datetimeFigureOut">
               <a:rPr lang="en-US" dirty="0"/>
-              <a:t>9/10/2022</a:t>
+              <a:t>9/11/2022</a:t>
             </a:fld>
             <a:endParaRPr lang="en-US" dirty="0"/>
           </a:p>
@@ -4520,7 +4525,7 @@
           <a:p>
             <a:fld id="{48A87A34-81AB-432B-8DAE-1953F412C126}" type="datetimeFigureOut">
               <a:rPr lang="en-US" dirty="0"/>
-              <a:t>9/10/2022</a:t>
+              <a:t>9/11/2022</a:t>
             </a:fld>
             <a:endParaRPr lang="en-US" dirty="0"/>
           </a:p>
@@ -4764,7 +4769,7 @@
           <a:p>
             <a:fld id="{48A87A34-81AB-432B-8DAE-1953F412C126}" type="datetimeFigureOut">
               <a:rPr lang="en-US" dirty="0"/>
-              <a:t>9/10/2022</a:t>
+              <a:t>9/11/2022</a:t>
             </a:fld>
             <a:endParaRPr lang="en-US" dirty="0"/>
           </a:p>
@@ -5016,7 +5021,7 @@
           <a:p>
             <a:fld id="{48A87A34-81AB-432B-8DAE-1953F412C126}" type="datetimeFigureOut">
               <a:rPr lang="en-US" dirty="0"/>
-              <a:t>9/10/2022</a:t>
+              <a:t>9/11/2022</a:t>
             </a:fld>
             <a:endParaRPr lang="en-US" dirty="0"/>
           </a:p>
@@ -5255,7 +5260,7 @@
             <a:fld id="{48A87A34-81AB-432B-8DAE-1953F412C126}" type="datetimeFigureOut">
               <a:rPr lang="en-US" dirty="0"/>
               <a:pPr/>
-              <a:t>9/10/2022</a:t>
+              <a:t>9/11/2022</a:t>
             </a:fld>
             <a:endParaRPr lang="en-US" dirty="0"/>
           </a:p>
@@ -6001,7 +6006,7 @@
             </a:r>
             <a:r>
               <a:rPr lang="es-AR" dirty="0"/>
-              <a:t> HOY EN DIA, HAY MUCHOS FACTORES DE DESARROLLO QUE NOS SINDICAN QUE LAS SOLUCIONES </a:t>
+              <a:t> HOY EN DIA, HAY MUCHOS FACTORES DE DESARROLLO QUE NOS INDICAN QUE LAS SOLUCIONES </a:t>
             </a:r>
             <a:r>
               <a:rPr lang="es-AR" dirty="0" err="1"/>
@@ -6009,7 +6014,7 @@
             </a:r>
             <a:r>
               <a:rPr lang="es-AR" dirty="0"/>
-              <a:t> INDUTRIALES PUEDEN DARNOS RESPUESTAS A OTRO NIVEL, COMO ES EL DOMICILIARIO, DESDE ADAPTAR ESTE TIPO DE TECNOLOGIA, PARA PERSONAS MINUSVALIDAS, INVIDENTES, ETC. ES POR ELLO QUE EL APLICAR ESTA TECNOLOGIA  NOS AYUDARÍA A DARLE SOLUCIONES INNOVADORAS A NIVEL BAJO COMO EL USO DOMIICILIARIO, YA SEA, DESDE TRANSPORTE DE MEDICAMENTOS HASTA JUGAR CON NUESTRAS MASCOTAS.</a:t>
+              <a:t> INDUTRIALES PUEDEN DARNOS RESPUESTAS A OTRO NIVEL, COMO ES EL DOMICILIARIO, DESDE ADAPTAR ESTE TIPO DE TECNOLOGIA, PARA PERSONAS MINUSVALIDAS, INVIDENTES, ETC. ES POR ELLO QUE EL APLICAR ESTA TECNOLOGIA  NOS AYUDARÍA A DARLE SOLUCIONES INNOVADORAS A NIVEL BAJO, COMO EL USO DOMIICILIARIO, YA SEA, DESDE TRANSPORTE DE MEDICAMENTOS HASTA JUGAR CON NUESTRAS MASCOTAS.</a:t>
             </a:r>
           </a:p>
         </p:txBody>
@@ -6580,7 +6585,7 @@
             <a:pPr algn="just"/>
             <a:r>
               <a:rPr lang="es-AR" dirty="0"/>
-              <a:t>PARA ELLO SE DESARROLLO A NIVEL GENERAL EL SIGUIENTE DIAGRAMA DE BLOQUE, EL CUAL CORRESPODE AL AVG GENERAL CON POSIBILDAD DE NUEVAS ADAPTACIONES, YA SEA DESDE UN TRANSPORTADOR, UN ENTRETENIMIENTO DE MASCOTAS, COMO UN SENSOR DE PLANTAS ENTRE MILES DE POSIBILIDADES,</a:t>
+              <a:t>PARA ELLO SE DESARROLLO A NIVEL GENERAL EL SIGUIENTE DIAGRAMA DE BLOQUE, EL CUAL CORRESPODE AL AGV GENERAL CON POSIBILDAD DE NUEVAS ADAPTACIONES, YA SEA DESDE UN TRANSPORTADOR, UN ENTRETENIMIENTO DE MASCOTAS, COMO UN SENSOR DE PLANTAS ENTRE MILES DE POSIBILIDADES,</a:t>
             </a:r>
           </a:p>
         </p:txBody>

</xml_diff>

<commit_message>
Correciones a la presentacion
Se realizan pequeñas correciones a la presentacion
</commit_message>
<xml_diff>
--- a/PROYECTO AUTO/MATERIAL AULICO/Implementacion de proyecto Iot – grupo 3.pptx
+++ b/PROYECTO AUTO/MATERIAL AULICO/Implementacion de proyecto Iot – grupo 3.pptx
@@ -460,7 +460,7 @@
           </a:lstStyle>
           <a:p>
             <a:r>
-              <a:rPr lang="es-ES"/>
+              <a:rPr lang="es-ES" dirty="0"/>
               <a:t>Haga clic en el icono para agregar una imagen</a:t>
             </a:r>
             <a:endParaRPr lang="en-US" dirty="0"/>
@@ -2337,7 +2337,7 @@
           </a:lstStyle>
           <a:p>
             <a:r>
-              <a:rPr lang="es-ES"/>
+              <a:rPr lang="es-ES" dirty="0"/>
               <a:t>Haga clic en el icono para agregar una imagen</a:t>
             </a:r>
             <a:endParaRPr lang="en-US" dirty="0"/>
@@ -2554,7 +2554,7 @@
           </a:lstStyle>
           <a:p>
             <a:r>
-              <a:rPr lang="es-ES"/>
+              <a:rPr lang="es-ES" dirty="0"/>
               <a:t>Haga clic en el icono para agregar una imagen</a:t>
             </a:r>
             <a:endParaRPr lang="en-US" dirty="0"/>
@@ -2771,7 +2771,7 @@
           </a:lstStyle>
           <a:p>
             <a:r>
-              <a:rPr lang="es-ES"/>
+              <a:rPr lang="es-ES" dirty="0"/>
               <a:t>Haga clic en el icono para agregar una imagen</a:t>
             </a:r>
             <a:endParaRPr lang="en-US" dirty="0"/>
@@ -4932,7 +4932,7 @@
           </a:lstStyle>
           <a:p>
             <a:r>
-              <a:rPr lang="es-ES"/>
+              <a:rPr lang="es-ES" dirty="0"/>
               <a:t>Haga clic en el icono para agregar una imagen</a:t>
             </a:r>
             <a:endParaRPr lang="en-US" dirty="0"/>
@@ -5697,20 +5697,8 @@
           <a:p>
             <a:pPr algn="ctr"/>
             <a:r>
-              <a:rPr lang="es-AR" b="1" dirty="0" err="1"/>
-              <a:t>Implementacion</a:t>
-            </a:r>
-            <a:r>
               <a:rPr lang="es-AR" b="1" dirty="0"/>
-              <a:t> de proyecto </a:t>
-            </a:r>
-            <a:r>
-              <a:rPr lang="es-AR" b="1" dirty="0" err="1"/>
-              <a:t>Iot</a:t>
-            </a:r>
-            <a:r>
-              <a:rPr lang="es-AR" b="1" dirty="0"/>
-              <a:t> – grupo 3</a:t>
+              <a:t>Implementación de proyecto Iot – grupo 3</a:t>
             </a:r>
           </a:p>
         </p:txBody>
@@ -5786,15 +5774,7 @@
             </a:r>
             <a:r>
               <a:rPr lang="es-AR" dirty="0"/>
-              <a:t> IMPLETENTAR UN DISPODITIVO </a:t>
-            </a:r>
-            <a:r>
-              <a:rPr lang="es-AR" dirty="0" err="1"/>
-              <a:t>IoT</a:t>
-            </a:r>
-            <a:r>
-              <a:rPr lang="es-AR" dirty="0"/>
-              <a:t>, COMO LO ES UN CARRO AGV USADO A NIVEL INDUTRIAL, PARA SU DESARROLLO A NIVEL DOMICILIARIO</a:t>
+              <a:t> IMPLEMENTAR UN DISPOSITIVO IoT, COMO LO ES UN CARRO AGV USADO A NIVEL INDUSTRIAL, PARA SU DESARROLLO A NIVEL DOMICILIARIO.</a:t>
             </a:r>
           </a:p>
         </p:txBody>
@@ -6006,15 +5986,7 @@
             </a:r>
             <a:r>
               <a:rPr lang="es-AR" dirty="0"/>
-              <a:t> HOY EN DIA, HAY MUCHOS FACTORES DE DESARROLLO QUE NOS INDICAN QUE LAS SOLUCIONES </a:t>
-            </a:r>
-            <a:r>
-              <a:rPr lang="es-AR" dirty="0" err="1"/>
-              <a:t>IoT</a:t>
-            </a:r>
-            <a:r>
-              <a:rPr lang="es-AR" dirty="0"/>
-              <a:t> INDUTRIALES PUEDEN DARNOS RESPUESTAS A OTRO NIVEL, COMO ES EL DOMICILIARIO, DESDE ADAPTAR ESTE TIPO DE TECNOLOGIA, PARA PERSONAS MINUSVALIDAS, INVIDENTES, ETC. ES POR ELLO QUE EL APLICAR ESTA TECNOLOGIA  NOS AYUDARÍA A DARLE SOLUCIONES INNOVADORAS A NIVEL BAJO, COMO EL USO DOMIICILIARIO, YA SEA, DESDE TRANSPORTE DE MEDICAMENTOS HASTA JUGAR CON NUESTRAS MASCOTAS.</a:t>
+              <a:t> HOY EN DIA, HAY MUCHOS FACTORES DE DESARROLLO QUE NOS INDICAN QUE LAS SOLUCIONES IoT INDUSTRIALES PUEDEN DARNOS RESPUESTAS A OTRO NIVEL, COMO ES EL DOMICILIARIO, DESDE ADAPTAR ESTE TIPO DE TECNOLOGIA, PARA PERSONAS MINUSVALIDAS, INVIDENTES, ETC. ES POR ELLO QUE EL APLICAR ESTA TECNOLOGIA  NOS AYUDARÍA A DARLE SOLUCIONES INNOVADORAS A NIVEL BAJO, COMO EL USO DOMICILIARIO, YA SEA, DESDE TRANSPORTE DE MEDICAMENTOS HASTA JUGAR CON NUESTRAS MASCOTAS.</a:t>
             </a:r>
           </a:p>
         </p:txBody>
@@ -6119,15 +6091,7 @@
             <a:pPr algn="ctr"/>
             <a:r>
               <a:rPr lang="es-AR" b="1" dirty="0"/>
-              <a:t>Implementación de proyecto </a:t>
-            </a:r>
-            <a:r>
-              <a:rPr lang="es-AR" b="1" dirty="0" err="1"/>
-              <a:t>Iot</a:t>
-            </a:r>
-            <a:r>
-              <a:rPr lang="es-AR" b="1" dirty="0"/>
-              <a:t> – grupo 3</a:t>
+              <a:t>Implementación de proyecto Iot – grupo 3</a:t>
             </a:r>
           </a:p>
         </p:txBody>
@@ -6377,7 +6341,7 @@
             </a:r>
             <a:r>
               <a:rPr lang="es-AR" dirty="0"/>
-              <a:t> EL DIAGRAMA RESPONDE A LA ESTRUCTURA GENERAL DE DESARROLLO DEL AGV NIVEL DOMICILIARIO, LO QUE PROPONE  SOLUCIONAR EL PROBLEMA Y ABARCAR UN ABANICO DE POSIBILIDADES PARA  ADPTARLO A NUEVAS FUNCIONALIDADES, SIN NECESIDAD DE QUE EL PROPIETARIO REQUIERA CONOCIMIENTOS TECNICOS</a:t>
+              <a:t> EL DIAGRAMA RESPONDE A LA ESTRUCTURA GENERAL DE DESARROLLO DEL AGV NIVEL DOMICILIARIO, LO QUE PROPONE  SOLUCIONAR EL PROBLEMA Y ABARCAR UN ABANICO DE POSIBILIDADES PARA  ADAPTARLO A NUEVAS FUNCIONALIDADES, SIN NECESIDAD DE QUE EL PROPIETARIO REQUIERA CONOCIMIENTOS TECNICOS.</a:t>
             </a:r>
           </a:p>
         </p:txBody>
@@ -6445,7 +6409,7 @@
             </a:pPr>
             <a:r>
               <a:rPr lang="es-AR" dirty="0"/>
-              <a:t>UNO DE ESTOS EJEMPLOS, ES FRENTE A PERSONAS MINUSVALIDAS MOTRIZMENTE, QUE PUEDAN ALCANZAR MEDICAMENTOS, AGUAS, ENTRE OTROS, Y AL CONCLUIR CON SU LABOR ESPECIFICA DE ATENCION, NO SEA NECESARIO EL DESCARTE O ABANDOO DEL DISPOSITIVO, SINO MAS BIEN LA RE-ADAPTACION DEL MISMOM PARA NUEVAS FUNCIONALIDADES, COMO ENTRETENER UNA MASCOTA, SIN QUE ELLO IMPLIQUE UN GASTO ARBITRARIO AL USUARIO, SI NO MAS BIEN, CON LA ADQUISICION DE UN KIT, LA READAPTACION DE LA FUNCIONALIDAD DEL AVG.</a:t>
+              <a:t>UNO DE ESTOS EJEMPLOS, ES FRENTE A PERSONAS MINUSVALIDAS MOTRIZMENTE, QUE PUEDAN ALCANZAR MEDICAMENTOS, AGUAS, ENTRE OTROS, Y AL CONCLUIR CON SU LABOR ESPECIFICA DE ATENCION, NO SEA NECESARIO EL DESCARTE O ABANDONO DEL DISPOSITIVO, SINO MAS BIEN LA RE-ADAPTACION DEL MISMO PARA NUEVAS FUNCIONALIDADES, COMO ENTRETENER UNA MASCOTA, SIN QUE ELLO IMPLIQUE UN GASTO ARBITRARIO AL USUARIO, SI NO MAS BIEN, CON LA ADQUISICION DE UN KIT, LA RE-ADAPTACION DE LA FUNCIONALIDAD DEL AGV.</a:t>
             </a:r>
           </a:p>
         </p:txBody>
@@ -6481,15 +6445,7 @@
             <a:pPr algn="ctr"/>
             <a:r>
               <a:rPr lang="es-AR" b="1" dirty="0"/>
-              <a:t>Implementación de proyecto </a:t>
-            </a:r>
-            <a:r>
-              <a:rPr lang="es-AR" b="1" dirty="0" err="1"/>
-              <a:t>Iot</a:t>
-            </a:r>
-            <a:r>
-              <a:rPr lang="es-AR" b="1" dirty="0"/>
-              <a:t> – grupo 3</a:t>
+              <a:t>Implementación de proyecto Iot – grupo 3</a:t>
             </a:r>
           </a:p>
         </p:txBody>
@@ -6585,7 +6541,7 @@
             <a:pPr algn="just"/>
             <a:r>
               <a:rPr lang="es-AR" dirty="0"/>
-              <a:t>PARA ELLO SE DESARROLLO A NIVEL GENERAL EL SIGUIENTE DIAGRAMA DE BLOQUE, EL CUAL CORRESPODE AL AGV GENERAL CON POSIBILDAD DE NUEVAS ADAPTACIONES, YA SEA DESDE UN TRANSPORTADOR, UN ENTRETENIMIENTO DE MASCOTAS, COMO UN SENSOR DE PLANTAS ENTRE MILES DE POSIBILIDADES,</a:t>
+              <a:t>PARA ELLO SE DESARROLLO A NIVEL GENERAL EL SIGUIENTE DIAGRAMA DE BLOQUE, EL CUAL CORRESPONDE AL AGV GENERAL CON POSIBILDAD DE NUEVAS ADAPTACIONES, YA SEA DESDE UN TRANSPORTADOR, UN ENTRETENIMIENTO DE MASCOTAS, COMO UN SENSOR DE PLANTAS ENTRE MILES DE POSIBILIDADES.</a:t>
             </a:r>
           </a:p>
         </p:txBody>
@@ -6621,15 +6577,7 @@
             <a:pPr algn="ctr"/>
             <a:r>
               <a:rPr lang="es-AR" b="1" dirty="0"/>
-              <a:t>Implementación de proyecto </a:t>
-            </a:r>
-            <a:r>
-              <a:rPr lang="es-AR" b="1" dirty="0" err="1"/>
-              <a:t>Iot</a:t>
-            </a:r>
-            <a:r>
-              <a:rPr lang="es-AR" b="1" dirty="0"/>
-              <a:t> – grupo 3</a:t>
+              <a:t>Implementación de proyecto Iot – grupo 3</a:t>
             </a:r>
           </a:p>
         </p:txBody>
@@ -6724,7 +6672,7 @@
             <a:pPr algn="just"/>
             <a:r>
               <a:rPr lang="es-AR" dirty="0"/>
-              <a:t>COMO PARA ELLO EXISTE UN ABANICO DE POSIBILIDADES, DECIDIMOS IMPLEMETAR, LA SOLUCION RAIZ, VERSATIL A FUTUROS CAMBIOS DEL PROPIETARIO, ADAPTABLE A UN DESARROLLO AMIGABLE NO TENICO DEL MISMO</a:t>
+              <a:t>COMO PARA ELLO EXISTE UN ABANICO DE POSIBILIDADES, DECIDIMOS IMPLEMENTAR, LA SOLUCION DE RAIZ, VERSATIL A FUTUROS CAMBIOS DEL PROPIETARIO, ADAPTABLE A UN DESARROLLO AMIGABLE NO TECNICO DEL MISMO.</a:t>
             </a:r>
           </a:p>
         </p:txBody>
@@ -6760,15 +6708,7 @@
             <a:pPr algn="ctr"/>
             <a:r>
               <a:rPr lang="es-AR" b="1" dirty="0"/>
-              <a:t>Implementación de proyecto </a:t>
-            </a:r>
-            <a:r>
-              <a:rPr lang="es-AR" b="1" dirty="0" err="1"/>
-              <a:t>Iot</a:t>
-            </a:r>
-            <a:r>
-              <a:rPr lang="es-AR" b="1" dirty="0"/>
-              <a:t> – grupo 3</a:t>
+              <a:t>Implementación de proyecto Iot – grupo 3</a:t>
             </a:r>
           </a:p>
         </p:txBody>
@@ -6895,15 +6835,7 @@
             <a:pPr algn="ctr"/>
             <a:r>
               <a:rPr lang="es-AR" b="1" dirty="0"/>
-              <a:t>Implementación de proyecto </a:t>
-            </a:r>
-            <a:r>
-              <a:rPr lang="es-AR" b="1" dirty="0" err="1"/>
-              <a:t>Iot</a:t>
-            </a:r>
-            <a:r>
-              <a:rPr lang="es-AR" b="1" dirty="0"/>
-              <a:t> – grupo 3</a:t>
+              <a:t>Implementación de proyecto Iot – grupo 3</a:t>
             </a:r>
           </a:p>
         </p:txBody>

</xml_diff>